<commit_message>
Added unit test - mocha
</commit_message>
<xml_diff>
--- a/TypeScriptFundamentals.pptx
+++ b/TypeScriptFundamentals.pptx
@@ -111,6 +111,11 @@
       </a:defRPr>
     </a:lvl9pPr>
   </p:defaultTextStyle>
+  <p:extLst>
+    <p:ext uri="{EFAFB233-063F-42B5-8137-9DF3F51BA10A}">
+      <p15:sldGuideLst xmlns:p15="http://schemas.microsoft.com/office/powerpoint/2012/main"/>
+    </p:ext>
+  </p:extLst>
 </p:presentation>
 </file>
 
@@ -297,7 +302,7 @@
           <a:p>
             <a:fld id="{6DC6AB83-CA34-45E1-A431-EF3829A8AE0C}" type="datetimeFigureOut">
               <a:rPr lang="en-US" smtClean="0"/>
-              <a:t>5/14/2016</a:t>
+              <a:t>5/16/2016</a:t>
             </a:fld>
             <a:endParaRPr lang="en-US"/>
           </a:p>
@@ -577,7 +582,7 @@
           <a:p>
             <a:fld id="{6DC6AB83-CA34-45E1-A431-EF3829A8AE0C}" type="datetimeFigureOut">
               <a:rPr lang="en-US" smtClean="0"/>
-              <a:t>5/14/2016</a:t>
+              <a:t>5/16/2016</a:t>
             </a:fld>
             <a:endParaRPr lang="en-US"/>
           </a:p>
@@ -771,7 +776,7 @@
           <a:p>
             <a:fld id="{6DC6AB83-CA34-45E1-A431-EF3829A8AE0C}" type="datetimeFigureOut">
               <a:rPr lang="en-US" smtClean="0"/>
-              <a:t>5/14/2016</a:t>
+              <a:t>5/16/2016</a:t>
             </a:fld>
             <a:endParaRPr lang="en-US"/>
           </a:p>
@@ -1039,7 +1044,7 @@
           <a:p>
             <a:fld id="{6DC6AB83-CA34-45E1-A431-EF3829A8AE0C}" type="datetimeFigureOut">
               <a:rPr lang="en-US" smtClean="0"/>
-              <a:t>5/14/2016</a:t>
+              <a:t>5/16/2016</a:t>
             </a:fld>
             <a:endParaRPr lang="en-US"/>
           </a:p>
@@ -1371,7 +1376,7 @@
           <a:p>
             <a:fld id="{6DC6AB83-CA34-45E1-A431-EF3829A8AE0C}" type="datetimeFigureOut">
               <a:rPr lang="en-US" smtClean="0"/>
-              <a:t>5/14/2016</a:t>
+              <a:t>5/16/2016</a:t>
             </a:fld>
             <a:endParaRPr lang="en-US"/>
           </a:p>
@@ -1981,7 +1986,7 @@
           <a:p>
             <a:fld id="{6DC6AB83-CA34-45E1-A431-EF3829A8AE0C}" type="datetimeFigureOut">
               <a:rPr lang="en-US" smtClean="0"/>
-              <a:t>5/14/2016</a:t>
+              <a:t>5/16/2016</a:t>
             </a:fld>
             <a:endParaRPr lang="en-US"/>
           </a:p>
@@ -2828,7 +2833,7 @@
           <a:p>
             <a:fld id="{6DC6AB83-CA34-45E1-A431-EF3829A8AE0C}" type="datetimeFigureOut">
               <a:rPr lang="en-US" smtClean="0"/>
-              <a:t>5/14/2016</a:t>
+              <a:t>5/16/2016</a:t>
             </a:fld>
             <a:endParaRPr lang="en-US"/>
           </a:p>
@@ -2998,7 +3003,7 @@
           <a:p>
             <a:fld id="{6DC6AB83-CA34-45E1-A431-EF3829A8AE0C}" type="datetimeFigureOut">
               <a:rPr lang="en-US" smtClean="0"/>
-              <a:t>5/14/2016</a:t>
+              <a:t>5/16/2016</a:t>
             </a:fld>
             <a:endParaRPr lang="en-US"/>
           </a:p>
@@ -3178,7 +3183,7 @@
           <a:p>
             <a:fld id="{6DC6AB83-CA34-45E1-A431-EF3829A8AE0C}" type="datetimeFigureOut">
               <a:rPr lang="en-US" smtClean="0"/>
-              <a:t>5/14/2016</a:t>
+              <a:t>5/16/2016</a:t>
             </a:fld>
             <a:endParaRPr lang="en-US"/>
           </a:p>
@@ -3353,7 +3358,7 @@
           <a:p>
             <a:fld id="{6DC6AB83-CA34-45E1-A431-EF3829A8AE0C}" type="datetimeFigureOut">
               <a:rPr lang="en-US" smtClean="0"/>
-              <a:t>5/14/2016</a:t>
+              <a:t>5/16/2016</a:t>
             </a:fld>
             <a:endParaRPr lang="en-US"/>
           </a:p>
@@ -3597,7 +3602,7 @@
           <a:p>
             <a:fld id="{6DC6AB83-CA34-45E1-A431-EF3829A8AE0C}" type="datetimeFigureOut">
               <a:rPr lang="en-US" smtClean="0"/>
-              <a:t>5/14/2016</a:t>
+              <a:t>5/16/2016</a:t>
             </a:fld>
             <a:endParaRPr lang="en-US"/>
           </a:p>
@@ -3894,7 +3899,7 @@
           <a:p>
             <a:fld id="{6DC6AB83-CA34-45E1-A431-EF3829A8AE0C}" type="datetimeFigureOut">
               <a:rPr lang="en-US" smtClean="0"/>
-              <a:t>5/14/2016</a:t>
+              <a:t>5/16/2016</a:t>
             </a:fld>
             <a:endParaRPr lang="en-US"/>
           </a:p>
@@ -4337,7 +4342,7 @@
           <a:p>
             <a:fld id="{6DC6AB83-CA34-45E1-A431-EF3829A8AE0C}" type="datetimeFigureOut">
               <a:rPr lang="en-US" smtClean="0"/>
-              <a:t>5/14/2016</a:t>
+              <a:t>5/16/2016</a:t>
             </a:fld>
             <a:endParaRPr lang="en-US"/>
           </a:p>
@@ -4460,7 +4465,7 @@
           <a:p>
             <a:fld id="{6DC6AB83-CA34-45E1-A431-EF3829A8AE0C}" type="datetimeFigureOut">
               <a:rPr lang="en-US" smtClean="0"/>
-              <a:t>5/14/2016</a:t>
+              <a:t>5/16/2016</a:t>
             </a:fld>
             <a:endParaRPr lang="en-US"/>
           </a:p>
@@ -4555,7 +4560,7 @@
           <a:p>
             <a:fld id="{6DC6AB83-CA34-45E1-A431-EF3829A8AE0C}" type="datetimeFigureOut">
               <a:rPr lang="en-US" smtClean="0"/>
-              <a:t>5/14/2016</a:t>
+              <a:t>5/16/2016</a:t>
             </a:fld>
             <a:endParaRPr lang="en-US"/>
           </a:p>
@@ -4834,7 +4839,7 @@
           <a:p>
             <a:fld id="{6DC6AB83-CA34-45E1-A431-EF3829A8AE0C}" type="datetimeFigureOut">
               <a:rPr lang="en-US" smtClean="0"/>
-              <a:t>5/14/2016</a:t>
+              <a:t>5/16/2016</a:t>
             </a:fld>
             <a:endParaRPr lang="en-US"/>
           </a:p>
@@ -5114,7 +5119,7 @@
           <a:p>
             <a:fld id="{6DC6AB83-CA34-45E1-A431-EF3829A8AE0C}" type="datetimeFigureOut">
               <a:rPr lang="en-US" smtClean="0"/>
-              <a:t>5/14/2016</a:t>
+              <a:t>5/16/2016</a:t>
             </a:fld>
             <a:endParaRPr lang="en-US"/>
           </a:p>
@@ -5543,7 +5548,7 @@
           <a:p>
             <a:fld id="{6DC6AB83-CA34-45E1-A431-EF3829A8AE0C}" type="datetimeFigureOut">
               <a:rPr lang="en-US" smtClean="0"/>
-              <a:t>5/14/2016</a:t>
+              <a:t>5/16/2016</a:t>
             </a:fld>
             <a:endParaRPr lang="en-US"/>
           </a:p>
@@ -6273,24 +6278,16 @@
           </a:p>
           <a:p>
             <a:r>
+              <a:rPr lang="en-US" dirty="0" smtClean="0"/>
+              <a:t>Any </a:t>
+            </a:r>
+            <a:r>
               <a:rPr lang="en-US" dirty="0"/>
-              <a:t>“</a:t>
-            </a:r>
-            <a:r>
-              <a:rPr lang="en-US" dirty="0" err="1"/>
-              <a:t>TypeScript</a:t>
-            </a:r>
-            <a:r>
-              <a:rPr lang="en-US" dirty="0"/>
-              <a:t> lets you write JavaScript the way you really want to. </a:t>
-            </a:r>
-            <a:r>
-              <a:rPr lang="en-US" dirty="0" err="1"/>
-              <a:t>TypeScript</a:t>
-            </a:r>
-            <a:r>
-              <a:rPr lang="en-US" dirty="0"/>
-              <a:t> is a typed superset of JavaScript that compiles to plain JavaScript. Any browser. Any host. Any OS. Open Source.”</a:t>
+              <a:t>browser. Any host. Any OS. Open Source</a:t>
+            </a:r>
+            <a:r>
+              <a:rPr lang="en-US" dirty="0" smtClean="0"/>
+              <a:t>.</a:t>
             </a:r>
             <a:endParaRPr lang="en-US" dirty="0"/>
           </a:p>
@@ -6618,7 +6615,7 @@
         <p:spPr/>
         <p:txBody>
           <a:bodyPr>
-            <a:normAutofit lnSpcReduction="10000"/>
+            <a:normAutofit/>
           </a:bodyPr>
           <a:lstStyle/>
           <a:p>
@@ -6660,7 +6657,15 @@
             </a:pPr>
             <a:r>
               <a:rPr lang="en-US" dirty="0"/>
-              <a:t>Can define methods</a:t>
+              <a:t>Can </a:t>
+            </a:r>
+            <a:r>
+              <a:rPr lang="en-US"/>
+              <a:t>define </a:t>
+            </a:r>
+            <a:r>
+              <a:rPr lang="en-US" smtClean="0"/>
+              <a:t>methods</a:t>
             </a:r>
           </a:p>
           <a:p>
@@ -6673,22 +6678,12 @@
               </a:spcAft>
             </a:pPr>
             <a:r>
+              <a:rPr lang="en-US" smtClean="0"/>
+              <a:t>Can </a:t>
+            </a:r>
+            <a:r>
               <a:rPr lang="en-US" dirty="0"/>
-              <a:t>Can define functions</a:t>
-            </a:r>
-          </a:p>
-          <a:p>
-            <a:pPr>
-              <a:spcBef>
-                <a:spcPts val="1800"/>
-              </a:spcBef>
-              <a:spcAft>
-                <a:spcPts val="1800"/>
-              </a:spcAft>
-            </a:pPr>
-            <a:r>
-              <a:rPr lang="en-US" dirty="0"/>
-              <a:t>Can define indexers</a:t>
+              <a:t>define indexers</a:t>
             </a:r>
           </a:p>
           <a:p>

</xml_diff>

<commit_message>
check for undefined fixed
</commit_message>
<xml_diff>
--- a/TypeScriptFundamentals.pptx
+++ b/TypeScriptFundamentals.pptx
@@ -119,6 +119,18 @@
 </p:presentation>
 </file>
 
+<file path=ppt/commentAuthors.xml><?xml version="1.0" encoding="utf-8"?>
+<p:cmAuthorLst xmlns:a="http://schemas.openxmlformats.org/drawingml/2006/main" xmlns:r="http://schemas.openxmlformats.org/officeDocument/2006/relationships" xmlns:p="http://schemas.openxmlformats.org/presentationml/2006/main">
+  <p:cmAuthor id="1" name="Assen Illiev" initials="AI" lastIdx="2" clrIdx="0">
+    <p:extLst>
+      <p:ext uri="{19B8F6BF-5375-455C-9EA6-DF929625EA0E}">
+        <p15:presenceInfo xmlns:p15="http://schemas.microsoft.com/office/powerpoint/2012/main" userId="S-1-5-21-2448406460-2828086590-2809017384-789449" providerId="AD"/>
+      </p:ext>
+    </p:extLst>
+  </p:cmAuthor>
+</p:cmAuthorLst>
+</file>
+
 <file path=ppt/slideLayouts/slideLayout1.xml><?xml version="1.0" encoding="utf-8"?>
 <p:sldLayout xmlns:a="http://schemas.openxmlformats.org/drawingml/2006/main" xmlns:r="http://schemas.openxmlformats.org/officeDocument/2006/relationships" xmlns:p="http://schemas.openxmlformats.org/presentationml/2006/main" type="title" preserve="1">
   <p:cSld name="Title Slide">
@@ -302,7 +314,7 @@
           <a:p>
             <a:fld id="{6DC6AB83-CA34-45E1-A431-EF3829A8AE0C}" type="datetimeFigureOut">
               <a:rPr lang="en-US" smtClean="0"/>
-              <a:t>5/16/2016</a:t>
+              <a:t>5/17/2016</a:t>
             </a:fld>
             <a:endParaRPr lang="en-US"/>
           </a:p>
@@ -582,7 +594,7 @@
           <a:p>
             <a:fld id="{6DC6AB83-CA34-45E1-A431-EF3829A8AE0C}" type="datetimeFigureOut">
               <a:rPr lang="en-US" smtClean="0"/>
-              <a:t>5/16/2016</a:t>
+              <a:t>5/17/2016</a:t>
             </a:fld>
             <a:endParaRPr lang="en-US"/>
           </a:p>
@@ -776,7 +788,7 @@
           <a:p>
             <a:fld id="{6DC6AB83-CA34-45E1-A431-EF3829A8AE0C}" type="datetimeFigureOut">
               <a:rPr lang="en-US" smtClean="0"/>
-              <a:t>5/16/2016</a:t>
+              <a:t>5/17/2016</a:t>
             </a:fld>
             <a:endParaRPr lang="en-US"/>
           </a:p>
@@ -1044,7 +1056,7 @@
           <a:p>
             <a:fld id="{6DC6AB83-CA34-45E1-A431-EF3829A8AE0C}" type="datetimeFigureOut">
               <a:rPr lang="en-US" smtClean="0"/>
-              <a:t>5/16/2016</a:t>
+              <a:t>5/17/2016</a:t>
             </a:fld>
             <a:endParaRPr lang="en-US"/>
           </a:p>
@@ -1376,7 +1388,7 @@
           <a:p>
             <a:fld id="{6DC6AB83-CA34-45E1-A431-EF3829A8AE0C}" type="datetimeFigureOut">
               <a:rPr lang="en-US" smtClean="0"/>
-              <a:t>5/16/2016</a:t>
+              <a:t>5/17/2016</a:t>
             </a:fld>
             <a:endParaRPr lang="en-US"/>
           </a:p>
@@ -1986,7 +1998,7 @@
           <a:p>
             <a:fld id="{6DC6AB83-CA34-45E1-A431-EF3829A8AE0C}" type="datetimeFigureOut">
               <a:rPr lang="en-US" smtClean="0"/>
-              <a:t>5/16/2016</a:t>
+              <a:t>5/17/2016</a:t>
             </a:fld>
             <a:endParaRPr lang="en-US"/>
           </a:p>
@@ -2833,7 +2845,7 @@
           <a:p>
             <a:fld id="{6DC6AB83-CA34-45E1-A431-EF3829A8AE0C}" type="datetimeFigureOut">
               <a:rPr lang="en-US" smtClean="0"/>
-              <a:t>5/16/2016</a:t>
+              <a:t>5/17/2016</a:t>
             </a:fld>
             <a:endParaRPr lang="en-US"/>
           </a:p>
@@ -3003,7 +3015,7 @@
           <a:p>
             <a:fld id="{6DC6AB83-CA34-45E1-A431-EF3829A8AE0C}" type="datetimeFigureOut">
               <a:rPr lang="en-US" smtClean="0"/>
-              <a:t>5/16/2016</a:t>
+              <a:t>5/17/2016</a:t>
             </a:fld>
             <a:endParaRPr lang="en-US"/>
           </a:p>
@@ -3183,7 +3195,7 @@
           <a:p>
             <a:fld id="{6DC6AB83-CA34-45E1-A431-EF3829A8AE0C}" type="datetimeFigureOut">
               <a:rPr lang="en-US" smtClean="0"/>
-              <a:t>5/16/2016</a:t>
+              <a:t>5/17/2016</a:t>
             </a:fld>
             <a:endParaRPr lang="en-US"/>
           </a:p>
@@ -3358,7 +3370,7 @@
           <a:p>
             <a:fld id="{6DC6AB83-CA34-45E1-A431-EF3829A8AE0C}" type="datetimeFigureOut">
               <a:rPr lang="en-US" smtClean="0"/>
-              <a:t>5/16/2016</a:t>
+              <a:t>5/17/2016</a:t>
             </a:fld>
             <a:endParaRPr lang="en-US"/>
           </a:p>
@@ -3602,7 +3614,7 @@
           <a:p>
             <a:fld id="{6DC6AB83-CA34-45E1-A431-EF3829A8AE0C}" type="datetimeFigureOut">
               <a:rPr lang="en-US" smtClean="0"/>
-              <a:t>5/16/2016</a:t>
+              <a:t>5/17/2016</a:t>
             </a:fld>
             <a:endParaRPr lang="en-US"/>
           </a:p>
@@ -3899,7 +3911,7 @@
           <a:p>
             <a:fld id="{6DC6AB83-CA34-45E1-A431-EF3829A8AE0C}" type="datetimeFigureOut">
               <a:rPr lang="en-US" smtClean="0"/>
-              <a:t>5/16/2016</a:t>
+              <a:t>5/17/2016</a:t>
             </a:fld>
             <a:endParaRPr lang="en-US"/>
           </a:p>
@@ -4342,7 +4354,7 @@
           <a:p>
             <a:fld id="{6DC6AB83-CA34-45E1-A431-EF3829A8AE0C}" type="datetimeFigureOut">
               <a:rPr lang="en-US" smtClean="0"/>
-              <a:t>5/16/2016</a:t>
+              <a:t>5/17/2016</a:t>
             </a:fld>
             <a:endParaRPr lang="en-US"/>
           </a:p>
@@ -4465,7 +4477,7 @@
           <a:p>
             <a:fld id="{6DC6AB83-CA34-45E1-A431-EF3829A8AE0C}" type="datetimeFigureOut">
               <a:rPr lang="en-US" smtClean="0"/>
-              <a:t>5/16/2016</a:t>
+              <a:t>5/17/2016</a:t>
             </a:fld>
             <a:endParaRPr lang="en-US"/>
           </a:p>
@@ -4560,7 +4572,7 @@
           <a:p>
             <a:fld id="{6DC6AB83-CA34-45E1-A431-EF3829A8AE0C}" type="datetimeFigureOut">
               <a:rPr lang="en-US" smtClean="0"/>
-              <a:t>5/16/2016</a:t>
+              <a:t>5/17/2016</a:t>
             </a:fld>
             <a:endParaRPr lang="en-US"/>
           </a:p>
@@ -4839,7 +4851,7 @@
           <a:p>
             <a:fld id="{6DC6AB83-CA34-45E1-A431-EF3829A8AE0C}" type="datetimeFigureOut">
               <a:rPr lang="en-US" smtClean="0"/>
-              <a:t>5/16/2016</a:t>
+              <a:t>5/17/2016</a:t>
             </a:fld>
             <a:endParaRPr lang="en-US"/>
           </a:p>
@@ -5119,7 +5131,7 @@
           <a:p>
             <a:fld id="{6DC6AB83-CA34-45E1-A431-EF3829A8AE0C}" type="datetimeFigureOut">
               <a:rPr lang="en-US" smtClean="0"/>
-              <a:t>5/16/2016</a:t>
+              <a:t>5/17/2016</a:t>
             </a:fld>
             <a:endParaRPr lang="en-US"/>
           </a:p>
@@ -5548,7 +5560,7 @@
           <a:p>
             <a:fld id="{6DC6AB83-CA34-45E1-A431-EF3829A8AE0C}" type="datetimeFigureOut">
               <a:rPr lang="en-US" smtClean="0"/>
-              <a:t>5/16/2016</a:t>
+              <a:t>5/17/2016</a:t>
             </a:fld>
             <a:endParaRPr lang="en-US"/>
           </a:p>
@@ -6362,7 +6374,12 @@
             <p:ph idx="1"/>
           </p:nvPr>
         </p:nvSpPr>
-        <p:spPr/>
+        <p:spPr>
+          <a:xfrm>
+            <a:off x="1103313" y="2052918"/>
+            <a:ext cx="6669088" cy="4195481"/>
+          </a:xfrm>
+        </p:spPr>
         <p:txBody>
           <a:bodyPr>
             <a:normAutofit/>
@@ -6540,6 +6557,141 @@
               <a:rPr lang="en-US" dirty="0"/>
               <a:t> – no value</a:t>
             </a:r>
+          </a:p>
+        </p:txBody>
+      </p:sp>
+      <p:sp>
+        <p:nvSpPr>
+          <p:cNvPr id="9" name="TextBox 8"/>
+          <p:cNvSpPr txBox="1"/>
+          <p:nvPr/>
+        </p:nvSpPr>
+        <p:spPr>
+          <a:xfrm>
+            <a:off x="7984273" y="1694985"/>
+            <a:ext cx="4014439" cy="5262979"/>
+          </a:xfrm>
+          <a:prstGeom prst="rect">
+            <a:avLst/>
+          </a:prstGeom>
+          <a:noFill/>
+        </p:spPr>
+        <p:txBody>
+          <a:bodyPr wrap="square" rtlCol="0">
+            <a:spAutoFit/>
+          </a:bodyPr>
+          <a:lstStyle/>
+          <a:p>
+            <a:r>
+              <a:rPr lang="en-US" sz="1400" dirty="0">
+                <a:solidFill>
+                  <a:schemeClr val="accent6">
+                    <a:lumMod val="60000"/>
+                    <a:lumOff val="40000"/>
+                  </a:schemeClr>
+                </a:solidFill>
+              </a:rPr>
+              <a:t>All types in </a:t>
+            </a:r>
+            <a:r>
+              <a:rPr lang="en-US" sz="1400" dirty="0" err="1">
+                <a:solidFill>
+                  <a:schemeClr val="accent6">
+                    <a:lumMod val="60000"/>
+                    <a:lumOff val="40000"/>
+                  </a:schemeClr>
+                </a:solidFill>
+              </a:rPr>
+              <a:t>TypeScript</a:t>
+            </a:r>
+            <a:r>
+              <a:rPr lang="en-US" sz="1400" dirty="0">
+                <a:solidFill>
+                  <a:schemeClr val="accent6">
+                    <a:lumMod val="60000"/>
+                    <a:lumOff val="40000"/>
+                  </a:schemeClr>
+                </a:solidFill>
+              </a:rPr>
+              <a:t> are subtypes of a single top type called the Any type. The any keyword references this type. The Any type is the one type that can represent any JavaScript value with no constraints. All other types are categorized as primitive types, object types, or type parameters. These types introduce various static constraints on their values.</a:t>
+            </a:r>
+          </a:p>
+          <a:p>
+            <a:endParaRPr lang="en-US" sz="1400" dirty="0">
+              <a:solidFill>
+                <a:schemeClr val="accent6">
+                  <a:lumMod val="60000"/>
+                  <a:lumOff val="40000"/>
+                </a:schemeClr>
+              </a:solidFill>
+            </a:endParaRPr>
+          </a:p>
+          <a:p>
+            <a:r>
+              <a:rPr lang="en-US" sz="1400" dirty="0">
+                <a:solidFill>
+                  <a:schemeClr val="accent6">
+                    <a:lumMod val="60000"/>
+                    <a:lumOff val="40000"/>
+                  </a:schemeClr>
+                </a:solidFill>
+              </a:rPr>
+              <a:t>The primitive types are the Number, Boolean, String, Void, Null, and Undefined types along with user defined </a:t>
+            </a:r>
+            <a:r>
+              <a:rPr lang="en-US" sz="1400" dirty="0" err="1">
+                <a:solidFill>
+                  <a:schemeClr val="accent6">
+                    <a:lumMod val="60000"/>
+                    <a:lumOff val="40000"/>
+                  </a:schemeClr>
+                </a:solidFill>
+              </a:rPr>
+              <a:t>enum</a:t>
+            </a:r>
+            <a:r>
+              <a:rPr lang="en-US" sz="1400" dirty="0">
+                <a:solidFill>
+                  <a:schemeClr val="accent6">
+                    <a:lumMod val="60000"/>
+                    <a:lumOff val="40000"/>
+                  </a:schemeClr>
+                </a:solidFill>
+              </a:rPr>
+              <a:t> types. The number, </a:t>
+            </a:r>
+            <a:r>
+              <a:rPr lang="en-US" sz="1400" dirty="0" err="1">
+                <a:solidFill>
+                  <a:schemeClr val="accent6">
+                    <a:lumMod val="60000"/>
+                    <a:lumOff val="40000"/>
+                  </a:schemeClr>
+                </a:solidFill>
+              </a:rPr>
+              <a:t>boolean</a:t>
+            </a:r>
+            <a:r>
+              <a:rPr lang="en-US" sz="1400" dirty="0">
+                <a:solidFill>
+                  <a:schemeClr val="accent6">
+                    <a:lumMod val="60000"/>
+                    <a:lumOff val="40000"/>
+                  </a:schemeClr>
+                </a:solidFill>
+              </a:rPr>
+              <a:t>, string, and void keywords reference the Number, Boolean, String, and Void primitive types respectively. The Void type exists purely to indicate the absence of a value, such as in a function with no return value. It is not possible to explicitly reference the Null and Undefined types—only values of those types can be referenced, using the null and undefined literals.</a:t>
+            </a:r>
+          </a:p>
+          <a:p>
+            <a:endParaRPr lang="en-US" sz="1400" dirty="0">
+              <a:solidFill>
+                <a:schemeClr val="accent6">
+                  <a:lumMod val="60000"/>
+                  <a:lumOff val="40000"/>
+                </a:schemeClr>
+              </a:solidFill>
+            </a:endParaRPr>
           </a:p>
         </p:txBody>
       </p:sp>
@@ -6816,8 +6968,25 @@
           <a:p>
             <a:r>
               <a:rPr lang="en-US" dirty="0"/>
-              <a:t>Can define getters or setters</a:t>
-            </a:r>
+              <a:t>Can define getters or </a:t>
+            </a:r>
+            <a:r>
+              <a:rPr lang="en-US" smtClean="0"/>
+              <a:t>setters  (</a:t>
+            </a:r>
+            <a:r>
+              <a:rPr lang="en-US"/>
+              <a:t>ECMAScript </a:t>
+            </a:r>
+            <a:r>
+              <a:rPr lang="en-US" smtClean="0"/>
+              <a:t>5 and above</a:t>
+            </a:r>
+            <a:r>
+              <a:rPr lang="en-US" smtClean="0"/>
+              <a:t>)</a:t>
+            </a:r>
+            <a:endParaRPr lang="en-US" dirty="0"/>
           </a:p>
           <a:p>
             <a:r>

</xml_diff>